<commit_message>
Apr 8th: Spec Update 2
</commit_message>
<xml_diff>
--- a/DRAM_Submodules_Specs_v3.pptx
+++ b/DRAM_Submodules_Specs_v3.pptx
@@ -274,7 +274,7 @@
       </p15:sldGuideLst>
     </p:ext>
     <p:ext uri="GoogleSlidesCustomDataVersion2">
-      <go:slidesCustomData xmlns:go="http://customooxmlschemas.google.com/" xmlns:ahyp="http://schemas.microsoft.com/office/drawing/2018/hyperlinkcolor" xmlns:p15="http://schemas.microsoft.com/office/powerpoint/2012/main" xmlns:p14="http://schemas.microsoft.com/office/powerpoint/2010/main" xmlns:com="http://schemas.openxmlformats.org/drawingml/2006/compatibility" xmlns:pvml="urn:schemas-microsoft-com:office:powerpoint" xmlns:v="urn:schemas-microsoft-com:vml" xmlns:o="urn:schemas-microsoft-com:office:office" xmlns:dgm="http://schemas.openxmlformats.org/drawingml/2006/diagram" xmlns:c="http://schemas.openxmlformats.org/drawingml/2006/chart" xmlns:mv="urn:schemas-microsoft-com:mac:vml" xmlns:mc="http://schemas.openxmlformats.org/markup-compatibility/2006" xmlns="" r:id="rId25" roundtripDataSignature="AMtx7mgyDyfeZXYthNWFaC04EQTv1r7c8Q=="/>
+      <go:slidesCustomData xmlns="" xmlns:mc="http://schemas.openxmlformats.org/markup-compatibility/2006" xmlns:mv="urn:schemas-microsoft-com:mac:vml" xmlns:c="http://schemas.openxmlformats.org/drawingml/2006/chart" xmlns:dgm="http://schemas.openxmlformats.org/drawingml/2006/diagram" xmlns:o="urn:schemas-microsoft-com:office:office" xmlns:v="urn:schemas-microsoft-com:vml" xmlns:pvml="urn:schemas-microsoft-com:office:powerpoint" xmlns:com="http://schemas.openxmlformats.org/drawingml/2006/compatibility" xmlns:p14="http://schemas.microsoft.com/office/powerpoint/2010/main" xmlns:p15="http://schemas.microsoft.com/office/powerpoint/2012/main" xmlns:ahyp="http://schemas.microsoft.com/office/drawing/2018/hyperlinkcolor" xmlns:go="http://customooxmlschemas.google.com/" r:id="rId25" roundtripDataSignature="AMtx7mgyDyfeZXYthNWFaC04EQTv1r7c8Q=="/>
     </p:ext>
   </p:extLst>
 </p:presentation>
@@ -8368,7 +8368,7 @@
                 <a:cs typeface="Calibri"/>
                 <a:sym typeface="Calibri"/>
               </a:rPr>
-              <a:t>Deadline: 4/31 Wednesday</a:t>
+              <a:t>Deadline: 4/18 Wednesday</a:t>
             </a:r>
             <a:endParaRPr sz="1400" b="0" i="0" u="none" strike="noStrike" cap="none" dirty="0">
               <a:solidFill>
@@ -13692,7 +13692,7 @@
         <p:spPr>
           <a:xfrm>
             <a:off x="1855549" y="2869513"/>
-            <a:ext cx="1128900" cy="2475600"/>
+            <a:ext cx="1128900" cy="1873937"/>
           </a:xfrm>
           <a:prstGeom prst="flowChartAlternateProcess">
             <a:avLst/>
@@ -13823,7 +13823,7 @@
         </p:nvSpPr>
         <p:spPr>
           <a:xfrm>
-            <a:off x="266563" y="3884638"/>
+            <a:off x="263325" y="3599233"/>
             <a:ext cx="1544041" cy="317700"/>
           </a:xfrm>
           <a:prstGeom prst="rightArrow">
@@ -13888,7 +13888,7 @@
         </p:nvSpPr>
         <p:spPr>
           <a:xfrm>
-            <a:off x="162215" y="3614840"/>
+            <a:off x="158977" y="3329435"/>
             <a:ext cx="1128900" cy="307800"/>
           </a:xfrm>
           <a:prstGeom prst="rect">
@@ -14704,8 +14704,8 @@
         </p:nvGrpSpPr>
         <p:grpSpPr>
           <a:xfrm rot="5400000">
-            <a:off x="3810379" y="4467349"/>
-            <a:ext cx="275979" cy="1235333"/>
+            <a:off x="6328997" y="4672237"/>
+            <a:ext cx="275979" cy="860435"/>
             <a:chOff x="1175900" y="1034718"/>
             <a:chExt cx="378365" cy="705300"/>
           </a:xfrm>
@@ -14950,8 +14950,8 @@
         </p:nvSpPr>
         <p:spPr>
           <a:xfrm>
-            <a:off x="3096070" y="4652023"/>
-            <a:ext cx="2068917" cy="307736"/>
+            <a:off x="5878900" y="4671725"/>
+            <a:ext cx="1441043" cy="307736"/>
           </a:xfrm>
           <a:prstGeom prst="rect">
             <a:avLst/>
@@ -14994,7 +14994,7 @@
                 <a:cs typeface="Arial"/>
                 <a:sym typeface="Arial"/>
               </a:rPr>
-              <a:t>Access ordering queue</a:t>
+              <a:t>Order queue</a:t>
             </a:r>
             <a:endParaRPr sz="1400" b="0" i="0" u="none" strike="noStrike" cap="none" dirty="0">
               <a:solidFill>
@@ -15017,7 +15017,7 @@
         <p:spPr>
           <a:xfrm>
             <a:off x="5057460" y="2971385"/>
-            <a:ext cx="1441042" cy="967531"/>
+            <a:ext cx="1441042" cy="1654341"/>
           </a:xfrm>
           <a:prstGeom prst="flowChartAlternateProcess">
             <a:avLst/>
@@ -15109,6 +15109,76 @@
                 <a:sym typeface="Arial"/>
               </a:rPr>
               <a:t>Scheduler</a:t>
+            </a:r>
+          </a:p>
+          <a:p>
+            <a:pPr marL="0" marR="0" lvl="0" indent="0" algn="ctr" rtl="0">
+              <a:lnSpc>
+                <a:spcPct val="100000"/>
+              </a:lnSpc>
+              <a:spcBef>
+                <a:spcPts val="0"/>
+              </a:spcBef>
+              <a:spcAft>
+                <a:spcPts val="0"/>
+              </a:spcAft>
+              <a:buClr>
+                <a:srgbClr val="000000"/>
+              </a:buClr>
+              <a:buSzPts val="1400"/>
+              <a:buFont typeface="Arial"/>
+              <a:buNone/>
+            </a:pPr>
+            <a:r>
+              <a:rPr lang="en-US" dirty="0">
+                <a:solidFill>
+                  <a:schemeClr val="lt1"/>
+                </a:solidFill>
+              </a:rPr>
+              <a:t>&amp;</a:t>
+            </a:r>
+          </a:p>
+          <a:p>
+            <a:pPr marL="0" marR="0" lvl="0" indent="0" algn="ctr" rtl="0">
+              <a:lnSpc>
+                <a:spcPct val="100000"/>
+              </a:lnSpc>
+              <a:spcBef>
+                <a:spcPts val="0"/>
+              </a:spcBef>
+              <a:spcAft>
+                <a:spcPts val="0"/>
+              </a:spcAft>
+              <a:buClr>
+                <a:srgbClr val="000000"/>
+              </a:buClr>
+              <a:buSzPts val="1400"/>
+              <a:buFont typeface="Arial"/>
+              <a:buNone/>
+            </a:pPr>
+            <a:r>
+              <a:rPr lang="en-US" sz="1400" b="0" i="0" u="none" strike="noStrike" cap="none" dirty="0">
+                <a:solidFill>
+                  <a:srgbClr val="FF0000"/>
+                </a:solidFill>
+                <a:latin typeface="Arial"/>
+                <a:ea typeface="Arial"/>
+                <a:cs typeface="Arial"/>
+                <a:sym typeface="Arial"/>
+              </a:rPr>
+              <a:t>RAW</a:t>
+            </a:r>
+            <a:r>
+              <a:rPr lang="en-US" sz="1400" b="0" i="0" u="none" strike="noStrike" cap="none" dirty="0">
+                <a:solidFill>
+                  <a:schemeClr val="lt1"/>
+                </a:solidFill>
+                <a:latin typeface="Arial"/>
+                <a:ea typeface="Arial"/>
+                <a:cs typeface="Arial"/>
+                <a:sym typeface="Arial"/>
+              </a:rPr>
+              <a:t> Handler</a:t>
             </a:r>
             <a:endParaRPr sz="1400" b="0" i="0" u="none" strike="noStrike" cap="none" dirty="0">
               <a:solidFill>
@@ -15758,7 +15828,7 @@
         </p:nvSpPr>
         <p:spPr>
           <a:xfrm>
-            <a:off x="3161293" y="4051442"/>
+            <a:off x="3177576" y="3994759"/>
             <a:ext cx="1593897" cy="307800"/>
           </a:xfrm>
           <a:prstGeom prst="rect">
@@ -15842,111 +15912,13 @@
       </p:sp>
       <p:sp>
         <p:nvSpPr>
-          <p:cNvPr id="125" name="Google Shape;125;p4"/>
-          <p:cNvSpPr/>
-          <p:nvPr/>
-        </p:nvSpPr>
-        <p:spPr>
-          <a:xfrm>
-            <a:off x="5043918" y="4237605"/>
-            <a:ext cx="1441042" cy="423000"/>
-          </a:xfrm>
-          <a:prstGeom prst="flowChartAlternateProcess">
-            <a:avLst/>
-          </a:prstGeom>
-          <a:solidFill>
-            <a:schemeClr val="accent1"/>
-          </a:solidFill>
-          <a:ln w="25400" cap="flat" cmpd="sng">
-            <a:solidFill>
-              <a:srgbClr val="21364F"/>
-            </a:solidFill>
-            <a:prstDash val="solid"/>
-            <a:round/>
-            <a:headEnd type="none" w="sm" len="sm"/>
-            <a:tailEnd type="none" w="sm" len="sm"/>
-          </a:ln>
-        </p:spPr>
-        <p:txBody>
-          <a:bodyPr spcFirstLastPara="1" wrap="square" lIns="91425" tIns="91425" rIns="91425" bIns="91425" anchor="ctr" anchorCtr="0">
-            <a:noAutofit/>
-          </a:bodyPr>
-          <a:lstStyle/>
-          <a:p>
-            <a:pPr marL="0" marR="0" lvl="0" indent="0" algn="ctr" rtl="0">
-              <a:lnSpc>
-                <a:spcPct val="100000"/>
-              </a:lnSpc>
-              <a:spcBef>
-                <a:spcPts val="0"/>
-              </a:spcBef>
-              <a:spcAft>
-                <a:spcPts val="0"/>
-              </a:spcAft>
-              <a:buClr>
-                <a:srgbClr val="000000"/>
-              </a:buClr>
-              <a:buSzPts val="1400"/>
-              <a:buFont typeface="Arial"/>
-              <a:buNone/>
-            </a:pPr>
-            <a:r>
-              <a:rPr lang="en-US" dirty="0">
-                <a:solidFill>
-                  <a:schemeClr val="lt1"/>
-                </a:solidFill>
-              </a:rPr>
-              <a:t>RAW</a:t>
-            </a:r>
-            <a:endParaRPr dirty="0">
-              <a:solidFill>
-                <a:schemeClr val="lt1"/>
-              </a:solidFill>
-            </a:endParaRPr>
-          </a:p>
-          <a:p>
-            <a:pPr marL="0" marR="0" lvl="0" indent="0" algn="ctr" rtl="0">
-              <a:lnSpc>
-                <a:spcPct val="100000"/>
-              </a:lnSpc>
-              <a:spcBef>
-                <a:spcPts val="0"/>
-              </a:spcBef>
-              <a:spcAft>
-                <a:spcPts val="0"/>
-              </a:spcAft>
-              <a:buClr>
-                <a:srgbClr val="000000"/>
-              </a:buClr>
-              <a:buSzPts val="1400"/>
-              <a:buFont typeface="Arial"/>
-              <a:buNone/>
-            </a:pPr>
-            <a:r>
-              <a:rPr lang="en-US" dirty="0">
-                <a:solidFill>
-                  <a:schemeClr val="lt1"/>
-                </a:solidFill>
-              </a:rPr>
-              <a:t>detection</a:t>
-            </a:r>
-            <a:endParaRPr dirty="0">
-              <a:solidFill>
-                <a:schemeClr val="lt1"/>
-              </a:solidFill>
-            </a:endParaRPr>
-          </a:p>
-        </p:txBody>
-      </p:sp>
-      <p:sp>
-        <p:nvSpPr>
           <p:cNvPr id="126" name="Google Shape;126;p4"/>
           <p:cNvSpPr/>
           <p:nvPr/>
         </p:nvSpPr>
         <p:spPr>
           <a:xfrm>
-            <a:off x="3029393" y="4307163"/>
+            <a:off x="3045676" y="4250480"/>
             <a:ext cx="256823" cy="298500"/>
           </a:xfrm>
           <a:prstGeom prst="rightArrow">
@@ -16271,7 +16243,7 @@
         </p:nvGrpSpPr>
         <p:grpSpPr>
           <a:xfrm rot="5400000">
-            <a:off x="3793275" y="3891851"/>
+            <a:off x="3809558" y="3835168"/>
             <a:ext cx="275979" cy="1221178"/>
             <a:chOff x="1175900" y="1034718"/>
             <a:chExt cx="378365" cy="705300"/>
@@ -16517,7 +16489,7 @@
         </p:nvSpPr>
         <p:spPr>
           <a:xfrm>
-            <a:off x="4581237" y="4307163"/>
+            <a:off x="4597520" y="4250480"/>
             <a:ext cx="437498" cy="298500"/>
           </a:xfrm>
           <a:prstGeom prst="rightArrow">
@@ -16576,156 +16548,17 @@
       </p:sp>
       <p:sp>
         <p:nvSpPr>
-          <p:cNvPr id="140" name="Google Shape;140;p4"/>
-          <p:cNvSpPr/>
-          <p:nvPr/>
-        </p:nvSpPr>
-        <p:spPr>
-          <a:xfrm rot="16200000">
-            <a:off x="5643317" y="3923086"/>
-            <a:ext cx="263421" cy="295080"/>
-          </a:xfrm>
-          <a:prstGeom prst="rightArrow">
-            <a:avLst>
-              <a:gd name="adj1" fmla="val 50000"/>
-              <a:gd name="adj2" fmla="val 50000"/>
-            </a:avLst>
-          </a:prstGeom>
-          <a:solidFill>
-            <a:schemeClr val="accent1"/>
-          </a:solidFill>
-          <a:ln w="25400" cap="flat" cmpd="sng">
-            <a:solidFill>
-              <a:srgbClr val="21364F"/>
-            </a:solidFill>
-            <a:prstDash val="solid"/>
-            <a:round/>
-            <a:headEnd type="none" w="sm" len="sm"/>
-            <a:tailEnd type="none" w="sm" len="sm"/>
-          </a:ln>
-        </p:spPr>
-        <p:txBody>
-          <a:bodyPr spcFirstLastPara="1" wrap="square" lIns="91425" tIns="45700" rIns="91425" bIns="45700" anchor="ctr" anchorCtr="0">
-            <a:noAutofit/>
-          </a:bodyPr>
-          <a:lstStyle/>
-          <a:p>
-            <a:pPr marL="0" marR="0" lvl="0" indent="0" algn="ctr" rtl="0">
-              <a:lnSpc>
-                <a:spcPct val="100000"/>
-              </a:lnSpc>
-              <a:spcBef>
-                <a:spcPts val="0"/>
-              </a:spcBef>
-              <a:spcAft>
-                <a:spcPts val="0"/>
-              </a:spcAft>
-              <a:buClr>
-                <a:srgbClr val="000000"/>
-              </a:buClr>
-              <a:buSzPts val="1400"/>
-              <a:buFont typeface="Arial"/>
-              <a:buNone/>
-            </a:pPr>
-            <a:endParaRPr sz="1400" b="0" i="0" u="none" strike="noStrike" cap="none">
-              <a:solidFill>
-                <a:schemeClr val="lt1"/>
-              </a:solidFill>
-              <a:latin typeface="Arial"/>
-              <a:ea typeface="Arial"/>
-              <a:cs typeface="Arial"/>
-              <a:sym typeface="Arial"/>
-            </a:endParaRPr>
-          </a:p>
-        </p:txBody>
-      </p:sp>
-      <p:sp>
-        <p:nvSpPr>
           <p:cNvPr id="141" name="Google Shape;141;p4"/>
           <p:cNvSpPr/>
           <p:nvPr/>
         </p:nvSpPr>
         <p:spPr>
-          <a:xfrm>
-            <a:off x="3029393" y="4889526"/>
-            <a:ext cx="259800" cy="298500"/>
+          <a:xfrm rot="5400000">
+            <a:off x="5415149" y="4840620"/>
+            <a:ext cx="470934" cy="181441"/>
           </a:xfrm>
-          <a:prstGeom prst="rightArrow">
-            <a:avLst>
-              <a:gd name="adj1" fmla="val 50000"/>
-              <a:gd name="adj2" fmla="val 50000"/>
-            </a:avLst>
-          </a:prstGeom>
-          <a:solidFill>
-            <a:schemeClr val="accent1"/>
-          </a:solidFill>
-          <a:ln w="25400" cap="flat" cmpd="sng">
-            <a:solidFill>
-              <a:srgbClr val="21364F"/>
-            </a:solidFill>
-            <a:prstDash val="solid"/>
-            <a:round/>
-            <a:headEnd type="none" w="sm" len="sm"/>
-            <a:tailEnd type="none" w="sm" len="sm"/>
-          </a:ln>
-        </p:spPr>
-        <p:txBody>
-          <a:bodyPr spcFirstLastPara="1" wrap="square" lIns="91425" tIns="45700" rIns="91425" bIns="45700" anchor="ctr" anchorCtr="0">
-            <a:noAutofit/>
-          </a:bodyPr>
-          <a:lstStyle/>
-          <a:p>
-            <a:pPr marL="0" marR="0" lvl="0" indent="0" algn="ctr" rtl="0">
-              <a:lnSpc>
-                <a:spcPct val="100000"/>
-              </a:lnSpc>
-              <a:spcBef>
-                <a:spcPts val="0"/>
-              </a:spcBef>
-              <a:spcAft>
-                <a:spcPts val="0"/>
-              </a:spcAft>
-              <a:buClr>
-                <a:srgbClr val="000000"/>
-              </a:buClr>
-              <a:buSzPts val="1400"/>
-              <a:buFont typeface="Arial"/>
-              <a:buNone/>
-            </a:pPr>
-            <a:endParaRPr sz="1400" b="0" i="0" u="none" strike="noStrike" cap="none">
-              <a:solidFill>
-                <a:schemeClr val="lt1"/>
-              </a:solidFill>
-              <a:latin typeface="Arial"/>
-              <a:ea typeface="Arial"/>
-              <a:cs typeface="Arial"/>
-              <a:sym typeface="Arial"/>
-            </a:endParaRPr>
-          </a:p>
-        </p:txBody>
-      </p:sp>
-      <p:sp>
-        <p:nvSpPr>
-          <p:cNvPr id="2" name="Google Shape;139;p4">
-            <a:extLst>
-              <a:ext uri="{FF2B5EF4-FFF2-40B4-BE49-F238E27FC236}">
-                <a16:creationId xmlns:a16="http://schemas.microsoft.com/office/drawing/2014/main" id="{D0B64C3A-8F37-B1FB-D45F-2BA840264450}"/>
-              </a:ext>
-            </a:extLst>
-          </p:cNvPr>
-          <p:cNvSpPr/>
-          <p:nvPr/>
-        </p:nvSpPr>
-        <p:spPr>
-          <a:xfrm>
-            <a:off x="4588578" y="4935742"/>
-            <a:ext cx="2354390" cy="298500"/>
-          </a:xfrm>
-          <a:prstGeom prst="rightArrow">
-            <a:avLst>
-              <a:gd name="adj1" fmla="val 50000"/>
-              <a:gd name="adj2" fmla="val 50000"/>
-            </a:avLst>
+          <a:prstGeom prst="roundRect">
+            <a:avLst/>
           </a:prstGeom>
           <a:solidFill>
             <a:schemeClr val="accent1"/>
@@ -16984,7 +16817,38 @@
                 <a:cs typeface="Arial"/>
                 <a:sym typeface="Arial"/>
               </a:rPr>
-              <a:t>Bank Level Controller Selector</a:t>
+              <a:t>Channel</a:t>
+            </a:r>
+          </a:p>
+          <a:p>
+            <a:pPr marL="0" marR="0" lvl="0" indent="0" algn="ctr" rtl="0">
+              <a:lnSpc>
+                <a:spcPct val="100000"/>
+              </a:lnSpc>
+              <a:spcBef>
+                <a:spcPts val="0"/>
+              </a:spcBef>
+              <a:spcAft>
+                <a:spcPts val="0"/>
+              </a:spcAft>
+              <a:buClr>
+                <a:srgbClr val="000000"/>
+              </a:buClr>
+              <a:buSzPts val="1400"/>
+              <a:buFont typeface="Arial"/>
+              <a:buNone/>
+            </a:pPr>
+            <a:r>
+              <a:rPr lang="en-US" sz="1400" b="0" i="0" u="none" strike="noStrike" cap="none" dirty="0">
+                <a:solidFill>
+                  <a:schemeClr val="lt1"/>
+                </a:solidFill>
+                <a:latin typeface="Arial"/>
+                <a:ea typeface="Arial"/>
+                <a:cs typeface="Arial"/>
+                <a:sym typeface="Arial"/>
+              </a:rPr>
+              <a:t>Selector</a:t>
             </a:r>
             <a:endParaRPr sz="1400" b="0" i="0" u="none" strike="noStrike" cap="none" dirty="0">
               <a:solidFill>
@@ -17564,7 +17428,7 @@
                 <a:cs typeface="Arial"/>
                 <a:sym typeface="Arial"/>
               </a:rPr>
-              <a:t>RD </a:t>
+              <a:t>RD C</a:t>
             </a:r>
             <a:r>
               <a:rPr lang="en-US" dirty="0">
@@ -17572,7 +17436,7 @@
                   <a:schemeClr val="lt1"/>
                 </a:solidFill>
               </a:rPr>
-              <a:t>channel</a:t>
+              <a:t>hannel</a:t>
             </a:r>
           </a:p>
           <a:p>
@@ -18180,6 +18044,190 @@
             <a:endParaRPr sz="1400" b="0" i="0" u="none" strike="noStrike" cap="none" dirty="0">
               <a:solidFill>
                 <a:srgbClr val="FF0000"/>
+              </a:solidFill>
+              <a:latin typeface="Arial"/>
+              <a:ea typeface="Arial"/>
+              <a:cs typeface="Arial"/>
+              <a:sym typeface="Arial"/>
+            </a:endParaRPr>
+          </a:p>
+        </p:txBody>
+      </p:sp>
+      <p:cxnSp>
+        <p:nvCxnSpPr>
+          <p:cNvPr id="3" name="Google Shape;381;p6">
+            <a:extLst>
+              <a:ext uri="{FF2B5EF4-FFF2-40B4-BE49-F238E27FC236}">
+                <a16:creationId xmlns:a16="http://schemas.microsoft.com/office/drawing/2014/main" id="{0488E64E-1EC2-F167-14EB-7D9F5E87279D}"/>
+              </a:ext>
+            </a:extLst>
+          </p:cNvPr>
+          <p:cNvCxnSpPr>
+            <a:cxnSpLocks/>
+          </p:cNvCxnSpPr>
+          <p:nvPr/>
+        </p:nvCxnSpPr>
+        <p:spPr>
+          <a:xfrm>
+            <a:off x="3979709" y="5702638"/>
+            <a:ext cx="291981" cy="447866"/>
+          </a:xfrm>
+          <a:prstGeom prst="straightConnector1">
+            <a:avLst/>
+          </a:prstGeom>
+          <a:noFill/>
+          <a:ln w="38100" cap="flat" cmpd="sng">
+            <a:solidFill>
+              <a:schemeClr val="accent1"/>
+            </a:solidFill>
+            <a:prstDash val="solid"/>
+            <a:round/>
+            <a:headEnd type="none" w="sm" len="sm"/>
+            <a:tailEnd type="none" w="sm" len="sm"/>
+          </a:ln>
+          <a:effectLst>
+            <a:outerShdw blurRad="40000" dist="23000" dir="5400000" rotWithShape="0">
+              <a:srgbClr val="000000">
+                <a:alpha val="34509"/>
+              </a:srgbClr>
+            </a:outerShdw>
+          </a:effectLst>
+        </p:spPr>
+      </p:cxnSp>
+      <p:sp>
+        <p:nvSpPr>
+          <p:cNvPr id="4" name="Google Shape;384;p6">
+            <a:extLst>
+              <a:ext uri="{FF2B5EF4-FFF2-40B4-BE49-F238E27FC236}">
+                <a16:creationId xmlns:a16="http://schemas.microsoft.com/office/drawing/2014/main" id="{970F7E81-46B6-4930-C74F-4D5FFD5E216B}"/>
+              </a:ext>
+            </a:extLst>
+          </p:cNvPr>
+          <p:cNvSpPr txBox="1"/>
+          <p:nvPr/>
+        </p:nvSpPr>
+        <p:spPr>
+          <a:xfrm>
+            <a:off x="3894055" y="5449512"/>
+            <a:ext cx="586500" cy="307800"/>
+          </a:xfrm>
+          <a:prstGeom prst="rect">
+            <a:avLst/>
+          </a:prstGeom>
+          <a:noFill/>
+          <a:ln>
+            <a:noFill/>
+          </a:ln>
+        </p:spPr>
+        <p:txBody>
+          <a:bodyPr spcFirstLastPara="1" wrap="square" lIns="91425" tIns="45700" rIns="91425" bIns="45700" anchor="t" anchorCtr="0">
+            <a:spAutoFit/>
+          </a:bodyPr>
+          <a:lstStyle/>
+          <a:p>
+            <a:pPr marL="0" marR="0" lvl="0" indent="0" algn="l" rtl="0">
+              <a:lnSpc>
+                <a:spcPct val="100000"/>
+              </a:lnSpc>
+              <a:spcBef>
+                <a:spcPts val="0"/>
+              </a:spcBef>
+              <a:spcAft>
+                <a:spcPts val="0"/>
+              </a:spcAft>
+              <a:buClr>
+                <a:srgbClr val="000000"/>
+              </a:buClr>
+              <a:buSzPts val="1400"/>
+              <a:buFont typeface="Arial"/>
+              <a:buNone/>
+            </a:pPr>
+            <a:r>
+              <a:rPr lang="en-US" sz="1400" b="0" i="0" u="none" strike="noStrike" cap="none" dirty="0">
+                <a:solidFill>
+                  <a:srgbClr val="000000"/>
+                </a:solidFill>
+                <a:latin typeface="Arial"/>
+                <a:ea typeface="Arial"/>
+                <a:cs typeface="Arial"/>
+                <a:sym typeface="Arial"/>
+              </a:rPr>
+              <a:t>1024</a:t>
+            </a:r>
+            <a:endParaRPr sz="1400" b="0" i="0" u="none" strike="noStrike" cap="none" dirty="0">
+              <a:solidFill>
+                <a:srgbClr val="000000"/>
+              </a:solidFill>
+              <a:latin typeface="Arial"/>
+              <a:ea typeface="Arial"/>
+              <a:cs typeface="Arial"/>
+              <a:sym typeface="Arial"/>
+            </a:endParaRPr>
+          </a:p>
+        </p:txBody>
+      </p:sp>
+      <p:sp>
+        <p:nvSpPr>
+          <p:cNvPr id="6" name="Google Shape;70;p4">
+            <a:extLst>
+              <a:ext uri="{FF2B5EF4-FFF2-40B4-BE49-F238E27FC236}">
+                <a16:creationId xmlns:a16="http://schemas.microsoft.com/office/drawing/2014/main" id="{05D7F9EC-44BE-2491-4D0E-D1EA3E69EA7A}"/>
+              </a:ext>
+            </a:extLst>
+          </p:cNvPr>
+          <p:cNvSpPr/>
+          <p:nvPr/>
+        </p:nvSpPr>
+        <p:spPr>
+          <a:xfrm>
+            <a:off x="5559895" y="4930948"/>
+            <a:ext cx="506884" cy="355343"/>
+          </a:xfrm>
+          <a:prstGeom prst="rightArrow">
+            <a:avLst>
+              <a:gd name="adj1" fmla="val 50000"/>
+              <a:gd name="adj2" fmla="val 50000"/>
+            </a:avLst>
+          </a:prstGeom>
+          <a:solidFill>
+            <a:schemeClr val="accent1"/>
+          </a:solidFill>
+          <a:ln w="25400" cap="flat" cmpd="sng">
+            <a:solidFill>
+              <a:srgbClr val="21364F"/>
+            </a:solidFill>
+            <a:prstDash val="solid"/>
+            <a:round/>
+            <a:headEnd type="none" w="sm" len="sm"/>
+            <a:tailEnd type="none" w="sm" len="sm"/>
+          </a:ln>
+        </p:spPr>
+        <p:txBody>
+          <a:bodyPr spcFirstLastPara="1" wrap="square" lIns="91425" tIns="45700" rIns="91425" bIns="45700" anchor="ctr" anchorCtr="0">
+            <a:noAutofit/>
+          </a:bodyPr>
+          <a:lstStyle/>
+          <a:p>
+            <a:pPr marL="0" marR="0" lvl="0" indent="0" algn="ctr" rtl="0">
+              <a:lnSpc>
+                <a:spcPct val="100000"/>
+              </a:lnSpc>
+              <a:spcBef>
+                <a:spcPts val="0"/>
+              </a:spcBef>
+              <a:spcAft>
+                <a:spcPts val="0"/>
+              </a:spcAft>
+              <a:buClr>
+                <a:srgbClr val="000000"/>
+              </a:buClr>
+              <a:buSzPts val="1400"/>
+              <a:buFont typeface="Arial"/>
+              <a:buNone/>
+            </a:pPr>
+            <a:endParaRPr sz="1400" b="0" i="0" u="none" strike="noStrike" cap="none">
+              <a:solidFill>
+                <a:schemeClr val="lt1"/>
               </a:solidFill>
               <a:latin typeface="Arial"/>
               <a:ea typeface="Arial"/>

</xml_diff>

<commit_message>
Apr 15th: port change
</commit_message>
<xml_diff>
--- a/DRAM_Submodules_Specs_v3.pptx
+++ b/DRAM_Submodules_Specs_v3.pptx
@@ -274,7 +274,7 @@
       </p15:sldGuideLst>
     </p:ext>
     <p:ext uri="GoogleSlidesCustomDataVersion2">
-      <go:slidesCustomData xmlns="" xmlns:mc="http://schemas.openxmlformats.org/markup-compatibility/2006" xmlns:mv="urn:schemas-microsoft-com:mac:vml" xmlns:c="http://schemas.openxmlformats.org/drawingml/2006/chart" xmlns:dgm="http://schemas.openxmlformats.org/drawingml/2006/diagram" xmlns:o="urn:schemas-microsoft-com:office:office" xmlns:v="urn:schemas-microsoft-com:vml" xmlns:pvml="urn:schemas-microsoft-com:office:powerpoint" xmlns:com="http://schemas.openxmlformats.org/drawingml/2006/compatibility" xmlns:p14="http://schemas.microsoft.com/office/powerpoint/2010/main" xmlns:p15="http://schemas.microsoft.com/office/powerpoint/2012/main" xmlns:ahyp="http://schemas.microsoft.com/office/drawing/2018/hyperlinkcolor" xmlns:go="http://customooxmlschemas.google.com/" r:id="rId25" roundtripDataSignature="AMtx7mgyDyfeZXYthNWFaC04EQTv1r7c8Q=="/>
+      <go:slidesCustomData xmlns:go="http://customooxmlschemas.google.com/" xmlns:ahyp="http://schemas.microsoft.com/office/drawing/2018/hyperlinkcolor" xmlns:p15="http://schemas.microsoft.com/office/powerpoint/2012/main" xmlns:p14="http://schemas.microsoft.com/office/powerpoint/2010/main" xmlns:com="http://schemas.openxmlformats.org/drawingml/2006/compatibility" xmlns:pvml="urn:schemas-microsoft-com:office:powerpoint" xmlns:v="urn:schemas-microsoft-com:vml" xmlns:o="urn:schemas-microsoft-com:office:office" xmlns:dgm="http://schemas.openxmlformats.org/drawingml/2006/diagram" xmlns:c="http://schemas.openxmlformats.org/drawingml/2006/chart" xmlns:mv="urn:schemas-microsoft-com:mac:vml" xmlns:mc="http://schemas.openxmlformats.org/markup-compatibility/2006" xmlns="" r:id="rId25" roundtripDataSignature="AMtx7mgyDyfeZXYthNWFaC04EQTv1r7c8Q=="/>
     </p:ext>
   </p:extLst>
 </p:presentation>
@@ -13800,6 +13800,38 @@
               <a:buNone/>
             </a:pPr>
             <a:r>
+              <a:rPr lang="en-US" altLang="zh-TW" dirty="0">
+                <a:solidFill>
+                  <a:schemeClr val="lt1"/>
+                </a:solidFill>
+              </a:rPr>
+              <a:t>Bank</a:t>
+            </a:r>
+            <a:endParaRPr lang="en-US" dirty="0">
+              <a:solidFill>
+                <a:schemeClr val="lt1"/>
+              </a:solidFill>
+            </a:endParaRPr>
+          </a:p>
+          <a:p>
+            <a:pPr marL="0" marR="0" lvl="0" indent="0" algn="ctr" rtl="0">
+              <a:lnSpc>
+                <a:spcPct val="100000"/>
+              </a:lnSpc>
+              <a:spcBef>
+                <a:spcPts val="0"/>
+              </a:spcBef>
+              <a:spcAft>
+                <a:spcPts val="0"/>
+              </a:spcAft>
+              <a:buClr>
+                <a:srgbClr val="000000"/>
+              </a:buClr>
+              <a:buSzPts val="1400"/>
+              <a:buFont typeface="Arial"/>
+              <a:buNone/>
+            </a:pPr>
+            <a:r>
               <a:rPr lang="en-US" dirty="0">
                 <a:solidFill>
                   <a:schemeClr val="lt1"/>
@@ -14944,72 +14976,6 @@
       </p:grpSp>
       <p:sp>
         <p:nvSpPr>
-          <p:cNvPr id="93" name="Google Shape;93;p4"/>
-          <p:cNvSpPr txBox="1"/>
-          <p:nvPr/>
-        </p:nvSpPr>
-        <p:spPr>
-          <a:xfrm>
-            <a:off x="5878900" y="4671725"/>
-            <a:ext cx="1441043" cy="307736"/>
-          </a:xfrm>
-          <a:prstGeom prst="rect">
-            <a:avLst/>
-          </a:prstGeom>
-          <a:noFill/>
-          <a:ln>
-            <a:noFill/>
-          </a:ln>
-        </p:spPr>
-        <p:txBody>
-          <a:bodyPr spcFirstLastPara="1" wrap="square" lIns="91425" tIns="45700" rIns="91425" bIns="45700" anchor="t" anchorCtr="0">
-            <a:spAutoFit/>
-          </a:bodyPr>
-          <a:lstStyle/>
-          <a:p>
-            <a:pPr marL="0" marR="0" lvl="0" indent="0" algn="l" rtl="0">
-              <a:lnSpc>
-                <a:spcPct val="100000"/>
-              </a:lnSpc>
-              <a:spcBef>
-                <a:spcPts val="0"/>
-              </a:spcBef>
-              <a:spcAft>
-                <a:spcPts val="0"/>
-              </a:spcAft>
-              <a:buClr>
-                <a:srgbClr val="000000"/>
-              </a:buClr>
-              <a:buSzPts val="1400"/>
-              <a:buFont typeface="Arial"/>
-              <a:buNone/>
-            </a:pPr>
-            <a:r>
-              <a:rPr lang="en-US" sz="1400" b="0" i="0" u="none" strike="noStrike" cap="none" dirty="0">
-                <a:solidFill>
-                  <a:srgbClr val="000000"/>
-                </a:solidFill>
-                <a:latin typeface="Arial"/>
-                <a:ea typeface="Arial"/>
-                <a:cs typeface="Arial"/>
-                <a:sym typeface="Arial"/>
-              </a:rPr>
-              <a:t>Order queue</a:t>
-            </a:r>
-            <a:endParaRPr sz="1400" b="0" i="0" u="none" strike="noStrike" cap="none" dirty="0">
-              <a:solidFill>
-                <a:srgbClr val="000000"/>
-              </a:solidFill>
-              <a:latin typeface="Arial"/>
-              <a:ea typeface="Arial"/>
-              <a:cs typeface="Arial"/>
-              <a:sym typeface="Arial"/>
-            </a:endParaRPr>
-          </a:p>
-        </p:txBody>
-      </p:sp>
-      <p:sp>
-        <p:nvSpPr>
           <p:cNvPr id="105" name="Google Shape;105;p4"/>
           <p:cNvSpPr/>
           <p:nvPr/>
@@ -18228,6 +18194,72 @@
             <a:endParaRPr sz="1400" b="0" i="0" u="none" strike="noStrike" cap="none">
               <a:solidFill>
                 <a:schemeClr val="lt1"/>
+              </a:solidFill>
+              <a:latin typeface="Arial"/>
+              <a:ea typeface="Arial"/>
+              <a:cs typeface="Arial"/>
+              <a:sym typeface="Arial"/>
+            </a:endParaRPr>
+          </a:p>
+        </p:txBody>
+      </p:sp>
+      <p:sp>
+        <p:nvSpPr>
+          <p:cNvPr id="93" name="Google Shape;93;p4"/>
+          <p:cNvSpPr txBox="1"/>
+          <p:nvPr/>
+        </p:nvSpPr>
+        <p:spPr>
+          <a:xfrm>
+            <a:off x="5676475" y="4653800"/>
+            <a:ext cx="1441043" cy="276959"/>
+          </a:xfrm>
+          <a:prstGeom prst="rect">
+            <a:avLst/>
+          </a:prstGeom>
+          <a:noFill/>
+          <a:ln>
+            <a:noFill/>
+          </a:ln>
+        </p:spPr>
+        <p:txBody>
+          <a:bodyPr spcFirstLastPara="1" wrap="square" lIns="91425" tIns="45700" rIns="91425" bIns="45700" anchor="t" anchorCtr="0">
+            <a:spAutoFit/>
+          </a:bodyPr>
+          <a:lstStyle/>
+          <a:p>
+            <a:pPr marL="0" marR="0" lvl="0" indent="0" algn="l" rtl="0">
+              <a:lnSpc>
+                <a:spcPct val="100000"/>
+              </a:lnSpc>
+              <a:spcBef>
+                <a:spcPts val="0"/>
+              </a:spcBef>
+              <a:spcAft>
+                <a:spcPts val="0"/>
+              </a:spcAft>
+              <a:buClr>
+                <a:srgbClr val="000000"/>
+              </a:buClr>
+              <a:buSzPts val="1400"/>
+              <a:buFont typeface="Arial"/>
+              <a:buNone/>
+            </a:pPr>
+            <a:r>
+              <a:rPr lang="en-US" sz="1200" b="0" i="0" u="none" strike="noStrike" cap="none" dirty="0">
+                <a:solidFill>
+                  <a:srgbClr val="000000"/>
+                </a:solidFill>
+                <a:latin typeface="Arial"/>
+                <a:ea typeface="Arial"/>
+                <a:cs typeface="Arial"/>
+                <a:sym typeface="Arial"/>
+              </a:rPr>
+              <a:t>Read Order queue</a:t>
+            </a:r>
+            <a:endParaRPr sz="1200" b="0" i="0" u="none" strike="noStrike" cap="none" dirty="0">
+              <a:solidFill>
+                <a:srgbClr val="000000"/>
               </a:solidFill>
               <a:latin typeface="Arial"/>
               <a:ea typeface="Arial"/>

</xml_diff>